<commit_message>
Add Python & Numpy 101
</commit_message>
<xml_diff>
--- a/doc/Automate Excel 101.pptx
+++ b/doc/Automate Excel 101.pptx
@@ -111,6 +111,11 @@
       </a:defRPr>
     </a:lvl9pPr>
   </p:defaultTextStyle>
+  <p:extLst>
+    <p:ext uri="{EFAFB233-063F-42B5-8137-9DF3F51BA10A}">
+      <p15:sldGuideLst xmlns:p15="http://schemas.microsoft.com/office/powerpoint/2012/main"/>
+    </p:ext>
+  </p:extLst>
 </p:presentation>
 </file>
 
@@ -261,7 +266,7 @@
           <a:p>
             <a:fld id="{6A4B53A7-3209-46A6-9454-F38EAC8F11E7}" type="datetimeFigureOut">
               <a:rPr lang="en-US" smtClean="0"/>
-              <a:t>11/2/2021</a:t>
+              <a:t>11/6/2021</a:t>
             </a:fld>
             <a:endParaRPr lang="en-US"/>
           </a:p>
@@ -512,7 +517,7 @@
           <a:p>
             <a:fld id="{6A4B53A7-3209-46A6-9454-F38EAC8F11E7}" type="datetimeFigureOut">
               <a:rPr lang="en-US" smtClean="0"/>
-              <a:t>11/2/2021</a:t>
+              <a:t>11/6/2021</a:t>
             </a:fld>
             <a:endParaRPr lang="en-US"/>
           </a:p>
@@ -773,7 +778,7 @@
           <a:p>
             <a:fld id="{6A4B53A7-3209-46A6-9454-F38EAC8F11E7}" type="datetimeFigureOut">
               <a:rPr lang="en-US" smtClean="0"/>
-              <a:t>11/2/2021</a:t>
+              <a:t>11/6/2021</a:t>
             </a:fld>
             <a:endParaRPr lang="en-US"/>
           </a:p>
@@ -1024,7 +1029,7 @@
           <a:p>
             <a:fld id="{6A4B53A7-3209-46A6-9454-F38EAC8F11E7}" type="datetimeFigureOut">
               <a:rPr lang="en-US" smtClean="0"/>
-              <a:t>11/2/2021</a:t>
+              <a:t>11/6/2021</a:t>
             </a:fld>
             <a:endParaRPr lang="en-US"/>
           </a:p>
@@ -1352,7 +1357,7 @@
           <a:p>
             <a:fld id="{6A4B53A7-3209-46A6-9454-F38EAC8F11E7}" type="datetimeFigureOut">
               <a:rPr lang="en-US" smtClean="0"/>
-              <a:t>11/2/2021</a:t>
+              <a:t>11/6/2021</a:t>
             </a:fld>
             <a:endParaRPr lang="en-US"/>
           </a:p>
@@ -1670,7 +1675,7 @@
           <a:p>
             <a:fld id="{6A4B53A7-3209-46A6-9454-F38EAC8F11E7}" type="datetimeFigureOut">
               <a:rPr lang="en-US" smtClean="0"/>
-              <a:t>11/2/2021</a:t>
+              <a:t>11/6/2021</a:t>
             </a:fld>
             <a:endParaRPr lang="en-US"/>
           </a:p>
@@ -2135,7 +2140,7 @@
           <a:p>
             <a:fld id="{6A4B53A7-3209-46A6-9454-F38EAC8F11E7}" type="datetimeFigureOut">
               <a:rPr lang="en-US" smtClean="0"/>
-              <a:t>11/2/2021</a:t>
+              <a:t>11/6/2021</a:t>
             </a:fld>
             <a:endParaRPr lang="en-US"/>
           </a:p>
@@ -2329,7 +2334,7 @@
           <a:p>
             <a:fld id="{6A4B53A7-3209-46A6-9454-F38EAC8F11E7}" type="datetimeFigureOut">
               <a:rPr lang="en-US" smtClean="0"/>
-              <a:t>11/2/2021</a:t>
+              <a:t>11/6/2021</a:t>
             </a:fld>
             <a:endParaRPr lang="en-US"/>
           </a:p>
@@ -2495,7 +2500,7 @@
           <a:p>
             <a:fld id="{6A4B53A7-3209-46A6-9454-F38EAC8F11E7}" type="datetimeFigureOut">
               <a:rPr lang="en-US" smtClean="0"/>
-              <a:t>11/2/2021</a:t>
+              <a:t>11/6/2021</a:t>
             </a:fld>
             <a:endParaRPr lang="en-US"/>
           </a:p>
@@ -2859,7 +2864,7 @@
           <a:p>
             <a:fld id="{6A4B53A7-3209-46A6-9454-F38EAC8F11E7}" type="datetimeFigureOut">
               <a:rPr lang="en-US" smtClean="0"/>
-              <a:t>11/2/2021</a:t>
+              <a:t>11/6/2021</a:t>
             </a:fld>
             <a:endParaRPr lang="en-US"/>
           </a:p>
@@ -3203,7 +3208,7 @@
           <a:p>
             <a:fld id="{6A4B53A7-3209-46A6-9454-F38EAC8F11E7}" type="datetimeFigureOut">
               <a:rPr lang="en-US" smtClean="0"/>
-              <a:t>11/2/2021</a:t>
+              <a:t>11/6/2021</a:t>
             </a:fld>
             <a:endParaRPr lang="en-US"/>
           </a:p>
@@ -3498,7 +3503,7 @@
             <a:fld id="{6A4B53A7-3209-46A6-9454-F38EAC8F11E7}" type="datetimeFigureOut">
               <a:rPr lang="en-US" smtClean="0"/>
               <a:pPr/>
-              <a:t>11/2/2021</a:t>
+              <a:t>11/6/2021</a:t>
             </a:fld>
             <a:endParaRPr lang="en-US" dirty="0"/>
           </a:p>
@@ -6078,11 +6083,6 @@
               </a:rPr>
               <a:t>]</a:t>
             </a:r>
-          </a:p>
-          <a:p>
-            <a:pPr marL="0" indent="0">
-              <a:buNone/>
-            </a:pPr>
             <a:endParaRPr lang="fr-FR" dirty="0">
               <a:solidFill>
                 <a:srgbClr val="000000"/>
@@ -6122,7 +6122,7 @@
                 <a:effectLst/>
                 <a:latin typeface="Consolas" panose="020B0609020204030204" pitchFamily="49" charset="0"/>
               </a:rPr>
-              <a:t>'Sheet2'</a:t>
+              <a:t>'Sheet2’</a:t>
             </a:r>
             <a:r>
               <a:rPr lang="en-US" b="0" dirty="0">
@@ -6134,6 +6134,27 @@
               </a:rPr>
               <a:t>)</a:t>
             </a:r>
+          </a:p>
+          <a:p>
+            <a:pPr marL="0" indent="0">
+              <a:buNone/>
+            </a:pPr>
+            <a:r>
+              <a:rPr lang="en-US" dirty="0" err="1">
+                <a:solidFill>
+                  <a:srgbClr val="000000"/>
+                </a:solidFill>
+                <a:latin typeface="Consolas" panose="020B0609020204030204" pitchFamily="49" charset="0"/>
+              </a:rPr>
+              <a:t>Workbook.sheetnames</a:t>
+            </a:r>
+            <a:endParaRPr lang="en-US" b="0" dirty="0">
+              <a:solidFill>
+                <a:srgbClr val="000000"/>
+              </a:solidFill>
+              <a:effectLst/>
+              <a:latin typeface="Consolas" panose="020B0609020204030204" pitchFamily="49" charset="0"/>
+            </a:endParaRPr>
           </a:p>
           <a:p>
             <a:pPr marL="0" indent="0">
@@ -7078,11 +7099,18 @@
               <a:buNone/>
             </a:pPr>
             <a:r>
+              <a:rPr lang="fr-FR" sz="1800" b="0">
+                <a:effectLst/>
+                <a:latin typeface="Consolas" panose="020B0609020204030204" pitchFamily="49" charset="0"/>
+              </a:rPr>
+              <a:t>values </a:t>
+            </a:r>
+            <a:r>
               <a:rPr lang="fr-FR" sz="1800" b="0" dirty="0">
                 <a:effectLst/>
                 <a:latin typeface="Consolas" panose="020B0609020204030204" pitchFamily="49" charset="0"/>
               </a:rPr>
-              <a:t>values = Reference(sheet_2, </a:t>
+              <a:t>= Reference(sheet_2, </a:t>
             </a:r>
             <a:r>
               <a:rPr lang="fr-FR" sz="1800" b="0" dirty="0" err="1">

</xml_diff>